<commit_message>
working on dashboard ui
</commit_message>
<xml_diff>
--- a/Test_Code/UI_examples/UI Mockup.pptx
+++ b/Test_Code/UI_examples/UI Mockup.pptx
@@ -6,6 +6,7 @@
   </p:sldMasterIdLst>
   <p:sldIdLst>
     <p:sldId id="257" r:id="rId2"/>
+    <p:sldId id="258" r:id="rId3"/>
   </p:sldIdLst>
   <p:sldSz cx="12192000" cy="6858000"/>
   <p:notesSz cx="6858000" cy="9144000"/>
@@ -3764,9 +3765,22 @@
                 <a:latin typeface="Courier New" panose="02070309020205020404" pitchFamily="49" charset="0"/>
                 <a:cs typeface="Courier New" panose="02070309020205020404" pitchFamily="49" charset="0"/>
               </a:rPr>
-              <a:t>Connected:                YES</a:t>
-            </a:r>
-            <a:endParaRPr lang="en-CA" sz="1600" dirty="0">
+              <a:t>Connected:                </a:t>
+            </a:r>
+            <a:r>
+              <a:rPr lang="en-CA" sz="1600" b="1" dirty="0" smtClean="0">
+                <a:solidFill>
+                  <a:srgbClr val="00B050"/>
+                </a:solidFill>
+                <a:latin typeface="Courier New" panose="02070309020205020404" pitchFamily="49" charset="0"/>
+                <a:cs typeface="Courier New" panose="02070309020205020404" pitchFamily="49" charset="0"/>
+              </a:rPr>
+              <a:t>YES</a:t>
+            </a:r>
+            <a:endParaRPr lang="en-CA" sz="1600" b="1" dirty="0">
+              <a:solidFill>
+                <a:srgbClr val="00B050"/>
+              </a:solidFill>
               <a:latin typeface="Courier New" panose="02070309020205020404" pitchFamily="49" charset="0"/>
               <a:cs typeface="Courier New" panose="02070309020205020404" pitchFamily="49" charset="0"/>
             </a:endParaRPr>
@@ -3802,11 +3816,21 @@
                 <a:latin typeface="Courier New" panose="02070309020205020404" pitchFamily="49" charset="0"/>
                 <a:cs typeface="Courier New" panose="02070309020205020404" pitchFamily="49" charset="0"/>
               </a:rPr>
-              <a:t>                   ON</a:t>
-            </a:r>
-            <a:endParaRPr lang="en-CA" sz="1600" dirty="0">
+              <a:t>                   </a:t>
+            </a:r>
+            <a:r>
+              <a:rPr lang="en-CA" sz="1600" b="1" dirty="0" smtClean="0">
+                <a:solidFill>
+                  <a:srgbClr val="00B050"/>
+                </a:solidFill>
+                <a:latin typeface="Courier New" panose="02070309020205020404" pitchFamily="49" charset="0"/>
+                <a:cs typeface="Courier New" panose="02070309020205020404" pitchFamily="49" charset="0"/>
+              </a:rPr>
+              <a:t>ON</a:t>
+            </a:r>
+            <a:endParaRPr lang="en-CA" sz="1600" b="1" dirty="0">
               <a:solidFill>
-                <a:schemeClr val="bg1"/>
+                <a:srgbClr val="00B050"/>
               </a:solidFill>
               <a:latin typeface="Courier New" panose="02070309020205020404" pitchFamily="49" charset="0"/>
               <a:cs typeface="Courier New" panose="02070309020205020404" pitchFamily="49" charset="0"/>
@@ -3836,11 +3860,21 @@
                 <a:latin typeface="Courier New" panose="02070309020205020404" pitchFamily="49" charset="0"/>
                 <a:cs typeface="Courier New" panose="02070309020205020404" pitchFamily="49" charset="0"/>
               </a:rPr>
-              <a:t>:                       ON</a:t>
-            </a:r>
-            <a:endParaRPr lang="en-CA" sz="1600" dirty="0">
+              <a:t>:                       </a:t>
+            </a:r>
+            <a:r>
+              <a:rPr lang="en-CA" sz="1600" b="1" dirty="0" smtClean="0">
+                <a:solidFill>
+                  <a:srgbClr val="00B050"/>
+                </a:solidFill>
+                <a:latin typeface="Courier New" panose="02070309020205020404" pitchFamily="49" charset="0"/>
+                <a:cs typeface="Courier New" panose="02070309020205020404" pitchFamily="49" charset="0"/>
+              </a:rPr>
+              <a:t>ON</a:t>
+            </a:r>
+            <a:endParaRPr lang="en-CA" sz="1600" b="1" dirty="0">
               <a:solidFill>
-                <a:schemeClr val="bg1"/>
+                <a:srgbClr val="00B050"/>
               </a:solidFill>
               <a:latin typeface="Courier New" panose="02070309020205020404" pitchFamily="49" charset="0"/>
               <a:cs typeface="Courier New" panose="02070309020205020404" pitchFamily="49" charset="0"/>
@@ -3870,11 +3904,21 @@
                 <a:latin typeface="Courier New" panose="02070309020205020404" pitchFamily="49" charset="0"/>
                 <a:cs typeface="Courier New" panose="02070309020205020404" pitchFamily="49" charset="0"/>
               </a:rPr>
-              <a:t>:	           OFF</a:t>
-            </a:r>
-            <a:endParaRPr lang="en-CA" sz="1600" dirty="0">
+              <a:t>:	           </a:t>
+            </a:r>
+            <a:r>
+              <a:rPr lang="en-CA" sz="1600" b="1" dirty="0" smtClean="0">
+                <a:solidFill>
+                  <a:srgbClr val="FF0000"/>
+                </a:solidFill>
+                <a:latin typeface="Courier New" panose="02070309020205020404" pitchFamily="49" charset="0"/>
+                <a:cs typeface="Courier New" panose="02070309020205020404" pitchFamily="49" charset="0"/>
+              </a:rPr>
+              <a:t>OFF</a:t>
+            </a:r>
+            <a:endParaRPr lang="en-CA" sz="1600" b="1" dirty="0">
               <a:solidFill>
-                <a:schemeClr val="bg1"/>
+                <a:srgbClr val="FF0000"/>
               </a:solidFill>
               <a:latin typeface="Courier New" panose="02070309020205020404" pitchFamily="49" charset="0"/>
               <a:cs typeface="Courier New" panose="02070309020205020404" pitchFamily="49" charset="0"/>
@@ -3894,7 +3938,17 @@
                 <a:latin typeface="Courier New" panose="02070309020205020404" pitchFamily="49" charset="0"/>
                 <a:cs typeface="Courier New" panose="02070309020205020404" pitchFamily="49" charset="0"/>
               </a:rPr>
-              <a:t>BLE Print:                OFF</a:t>
+              <a:t>BLE Print:                </a:t>
+            </a:r>
+            <a:r>
+              <a:rPr lang="en-CA" sz="1600" b="1" dirty="0" smtClean="0">
+                <a:solidFill>
+                  <a:srgbClr val="FF0000"/>
+                </a:solidFill>
+                <a:latin typeface="Courier New" panose="02070309020205020404" pitchFamily="49" charset="0"/>
+                <a:cs typeface="Courier New" panose="02070309020205020404" pitchFamily="49" charset="0"/>
+              </a:rPr>
+              <a:t>OFF</a:t>
             </a:r>
           </a:p>
           <a:p>
@@ -3911,11 +3965,21 @@
                 <a:latin typeface="Courier New" panose="02070309020205020404" pitchFamily="49" charset="0"/>
                 <a:cs typeface="Courier New" panose="02070309020205020404" pitchFamily="49" charset="0"/>
               </a:rPr>
-              <a:t>Logging:	           OFF</a:t>
-            </a:r>
-            <a:endParaRPr lang="en-CA" sz="1600" dirty="0">
+              <a:t>Logging:	           </a:t>
+            </a:r>
+            <a:r>
+              <a:rPr lang="en-CA" sz="1600" b="1" dirty="0" smtClean="0">
+                <a:solidFill>
+                  <a:srgbClr val="FF0000"/>
+                </a:solidFill>
+                <a:latin typeface="Courier New" panose="02070309020205020404" pitchFamily="49" charset="0"/>
+                <a:cs typeface="Courier New" panose="02070309020205020404" pitchFamily="49" charset="0"/>
+              </a:rPr>
+              <a:t>OFF</a:t>
+            </a:r>
+            <a:endParaRPr lang="en-CA" sz="1600" b="1" dirty="0">
               <a:solidFill>
-                <a:schemeClr val="bg1"/>
+                <a:srgbClr val="FF0000"/>
               </a:solidFill>
               <a:latin typeface="Courier New" panose="02070309020205020404" pitchFamily="49" charset="0"/>
               <a:cs typeface="Courier New" panose="02070309020205020404" pitchFamily="49" charset="0"/>
@@ -4123,6 +4187,9 @@
                 <a14:imgProps xmlns:a14="http://schemas.microsoft.com/office/drawing/2010/main">
                   <a14:imgLayer r:embed="rId4">
                     <a14:imgEffect>
+                      <a14:backgroundRemoval t="10000" b="90000" l="10000" r="90000"/>
+                    </a14:imgEffect>
+                    <a14:imgEffect>
                       <a14:artisticPhotocopy/>
                     </a14:imgEffect>
                   </a14:imgLayer>
@@ -4151,6 +4218,339 @@
     <p:extLst>
       <p:ext uri="{BB962C8B-B14F-4D97-AF65-F5344CB8AC3E}">
         <p14:creationId xmlns:p14="http://schemas.microsoft.com/office/powerpoint/2010/main" val="3440542708"/>
+      </p:ext>
+    </p:extLst>
+  </p:cSld>
+  <p:clrMapOvr>
+    <a:masterClrMapping/>
+  </p:clrMapOvr>
+</p:sld>
+</file>
+
+<file path=ppt/slides/slide2.xml><?xml version="1.0" encoding="utf-8"?>
+<p:sld xmlns:a="http://schemas.openxmlformats.org/drawingml/2006/main" xmlns:r="http://schemas.openxmlformats.org/officeDocument/2006/relationships" xmlns:p="http://schemas.openxmlformats.org/presentationml/2006/main">
+  <p:cSld>
+    <p:spTree>
+      <p:nvGrpSpPr>
+        <p:cNvPr id="1" name=""/>
+        <p:cNvGrpSpPr/>
+        <p:nvPr/>
+      </p:nvGrpSpPr>
+      <p:grpSpPr>
+        <a:xfrm>
+          <a:off x="0" y="0"/>
+          <a:ext cx="0" cy="0"/>
+          <a:chOff x="0" y="0"/>
+          <a:chExt cx="0" cy="0"/>
+        </a:xfrm>
+      </p:grpSpPr>
+      <p:grpSp>
+        <p:nvGrpSpPr>
+          <p:cNvPr id="4" name="Group 3"/>
+          <p:cNvGrpSpPr/>
+          <p:nvPr/>
+        </p:nvGrpSpPr>
+        <p:grpSpPr>
+          <a:xfrm>
+            <a:off x="4229778" y="3309576"/>
+            <a:ext cx="4055107" cy="222357"/>
+            <a:chOff x="5524854" y="1664999"/>
+            <a:chExt cx="4845468" cy="283442"/>
+          </a:xfrm>
+        </p:grpSpPr>
+        <p:sp>
+          <p:nvSpPr>
+            <p:cNvPr id="5" name="Rectangle 4"/>
+            <p:cNvSpPr/>
+            <p:nvPr/>
+          </p:nvSpPr>
+          <p:spPr>
+            <a:xfrm>
+              <a:off x="5524854" y="1665004"/>
+              <a:ext cx="807578" cy="283437"/>
+            </a:xfrm>
+            <a:prstGeom prst="rect">
+              <a:avLst/>
+            </a:prstGeom>
+            <a:solidFill>
+              <a:srgbClr val="00B050"/>
+            </a:solidFill>
+            <a:ln w="28575">
+              <a:solidFill>
+                <a:schemeClr val="tx1"/>
+              </a:solidFill>
+            </a:ln>
+          </p:spPr>
+          <p:style>
+            <a:lnRef idx="2">
+              <a:schemeClr val="accent1">
+                <a:shade val="50000"/>
+              </a:schemeClr>
+            </a:lnRef>
+            <a:fillRef idx="1">
+              <a:schemeClr val="accent1"/>
+            </a:fillRef>
+            <a:effectRef idx="0">
+              <a:schemeClr val="accent1"/>
+            </a:effectRef>
+            <a:fontRef idx="minor">
+              <a:schemeClr val="lt1"/>
+            </a:fontRef>
+          </p:style>
+          <p:txBody>
+            <a:bodyPr rtlCol="0" anchor="ctr"/>
+            <a:lstStyle/>
+            <a:p>
+              <a:pPr algn="ctr"/>
+              <a:endParaRPr lang="en-CA"/>
+            </a:p>
+          </p:txBody>
+        </p:sp>
+        <p:sp>
+          <p:nvSpPr>
+            <p:cNvPr id="6" name="Rectangle 5"/>
+            <p:cNvSpPr/>
+            <p:nvPr/>
+          </p:nvSpPr>
+          <p:spPr>
+            <a:xfrm>
+              <a:off x="6332432" y="1665003"/>
+              <a:ext cx="807578" cy="283437"/>
+            </a:xfrm>
+            <a:prstGeom prst="rect">
+              <a:avLst/>
+            </a:prstGeom>
+            <a:solidFill>
+              <a:schemeClr val="bg1"/>
+            </a:solidFill>
+            <a:ln w="28575">
+              <a:solidFill>
+                <a:schemeClr val="tx1"/>
+              </a:solidFill>
+            </a:ln>
+          </p:spPr>
+          <p:style>
+            <a:lnRef idx="2">
+              <a:schemeClr val="accent1">
+                <a:shade val="50000"/>
+              </a:schemeClr>
+            </a:lnRef>
+            <a:fillRef idx="1">
+              <a:schemeClr val="accent1"/>
+            </a:fillRef>
+            <a:effectRef idx="0">
+              <a:schemeClr val="accent1"/>
+            </a:effectRef>
+            <a:fontRef idx="minor">
+              <a:schemeClr val="lt1"/>
+            </a:fontRef>
+          </p:style>
+          <p:txBody>
+            <a:bodyPr rtlCol="0" anchor="ctr"/>
+            <a:lstStyle/>
+            <a:p>
+              <a:pPr algn="ctr"/>
+              <a:endParaRPr lang="en-CA"/>
+            </a:p>
+          </p:txBody>
+        </p:sp>
+        <p:sp>
+          <p:nvSpPr>
+            <p:cNvPr id="7" name="Rectangle 6"/>
+            <p:cNvSpPr/>
+            <p:nvPr/>
+          </p:nvSpPr>
+          <p:spPr>
+            <a:xfrm>
+              <a:off x="7140010" y="1665002"/>
+              <a:ext cx="807578" cy="283437"/>
+            </a:xfrm>
+            <a:prstGeom prst="rect">
+              <a:avLst/>
+            </a:prstGeom>
+            <a:solidFill>
+              <a:srgbClr val="00B050"/>
+            </a:solidFill>
+            <a:ln w="28575">
+              <a:solidFill>
+                <a:schemeClr val="tx1"/>
+              </a:solidFill>
+            </a:ln>
+          </p:spPr>
+          <p:style>
+            <a:lnRef idx="2">
+              <a:schemeClr val="accent1">
+                <a:shade val="50000"/>
+              </a:schemeClr>
+            </a:lnRef>
+            <a:fillRef idx="1">
+              <a:schemeClr val="accent1"/>
+            </a:fillRef>
+            <a:effectRef idx="0">
+              <a:schemeClr val="accent1"/>
+            </a:effectRef>
+            <a:fontRef idx="minor">
+              <a:schemeClr val="lt1"/>
+            </a:fontRef>
+          </p:style>
+          <p:txBody>
+            <a:bodyPr rtlCol="0" anchor="ctr"/>
+            <a:lstStyle/>
+            <a:p>
+              <a:pPr algn="ctr"/>
+              <a:endParaRPr lang="en-CA"/>
+            </a:p>
+          </p:txBody>
+        </p:sp>
+        <p:sp>
+          <p:nvSpPr>
+            <p:cNvPr id="8" name="Rectangle 7"/>
+            <p:cNvSpPr/>
+            <p:nvPr/>
+          </p:nvSpPr>
+          <p:spPr>
+            <a:xfrm>
+              <a:off x="7947588" y="1665001"/>
+              <a:ext cx="807578" cy="283437"/>
+            </a:xfrm>
+            <a:prstGeom prst="rect">
+              <a:avLst/>
+            </a:prstGeom>
+            <a:solidFill>
+              <a:schemeClr val="bg1"/>
+            </a:solidFill>
+            <a:ln w="28575">
+              <a:solidFill>
+                <a:schemeClr val="tx1"/>
+              </a:solidFill>
+            </a:ln>
+          </p:spPr>
+          <p:style>
+            <a:lnRef idx="2">
+              <a:schemeClr val="accent1">
+                <a:shade val="50000"/>
+              </a:schemeClr>
+            </a:lnRef>
+            <a:fillRef idx="1">
+              <a:schemeClr val="accent1"/>
+            </a:fillRef>
+            <a:effectRef idx="0">
+              <a:schemeClr val="accent1"/>
+            </a:effectRef>
+            <a:fontRef idx="minor">
+              <a:schemeClr val="lt1"/>
+            </a:fontRef>
+          </p:style>
+          <p:txBody>
+            <a:bodyPr rtlCol="0" anchor="ctr"/>
+            <a:lstStyle/>
+            <a:p>
+              <a:pPr algn="ctr"/>
+              <a:endParaRPr lang="en-CA"/>
+            </a:p>
+          </p:txBody>
+        </p:sp>
+        <p:sp>
+          <p:nvSpPr>
+            <p:cNvPr id="9" name="Rectangle 8"/>
+            <p:cNvSpPr/>
+            <p:nvPr/>
+          </p:nvSpPr>
+          <p:spPr>
+            <a:xfrm>
+              <a:off x="8755166" y="1665000"/>
+              <a:ext cx="807578" cy="283437"/>
+            </a:xfrm>
+            <a:prstGeom prst="rect">
+              <a:avLst/>
+            </a:prstGeom>
+            <a:solidFill>
+              <a:schemeClr val="bg1"/>
+            </a:solidFill>
+            <a:ln w="28575">
+              <a:solidFill>
+                <a:schemeClr val="tx1"/>
+              </a:solidFill>
+            </a:ln>
+          </p:spPr>
+          <p:style>
+            <a:lnRef idx="2">
+              <a:schemeClr val="accent1">
+                <a:shade val="50000"/>
+              </a:schemeClr>
+            </a:lnRef>
+            <a:fillRef idx="1">
+              <a:schemeClr val="accent1"/>
+            </a:fillRef>
+            <a:effectRef idx="0">
+              <a:schemeClr val="accent1"/>
+            </a:effectRef>
+            <a:fontRef idx="minor">
+              <a:schemeClr val="lt1"/>
+            </a:fontRef>
+          </p:style>
+          <p:txBody>
+            <a:bodyPr rtlCol="0" anchor="ctr"/>
+            <a:lstStyle/>
+            <a:p>
+              <a:pPr algn="ctr"/>
+              <a:endParaRPr lang="en-CA"/>
+            </a:p>
+          </p:txBody>
+        </p:sp>
+        <p:sp>
+          <p:nvSpPr>
+            <p:cNvPr id="10" name="Rectangle 9"/>
+            <p:cNvSpPr/>
+            <p:nvPr/>
+          </p:nvSpPr>
+          <p:spPr>
+            <a:xfrm>
+              <a:off x="9562744" y="1664999"/>
+              <a:ext cx="807578" cy="283437"/>
+            </a:xfrm>
+            <a:prstGeom prst="rect">
+              <a:avLst/>
+            </a:prstGeom>
+            <a:solidFill>
+              <a:schemeClr val="bg1"/>
+            </a:solidFill>
+            <a:ln w="28575">
+              <a:solidFill>
+                <a:schemeClr val="tx1"/>
+              </a:solidFill>
+            </a:ln>
+          </p:spPr>
+          <p:style>
+            <a:lnRef idx="2">
+              <a:schemeClr val="accent1">
+                <a:shade val="50000"/>
+              </a:schemeClr>
+            </a:lnRef>
+            <a:fillRef idx="1">
+              <a:schemeClr val="accent1"/>
+            </a:fillRef>
+            <a:effectRef idx="0">
+              <a:schemeClr val="accent1"/>
+            </a:effectRef>
+            <a:fontRef idx="minor">
+              <a:schemeClr val="lt1"/>
+            </a:fontRef>
+          </p:style>
+          <p:txBody>
+            <a:bodyPr rtlCol="0" anchor="ctr"/>
+            <a:lstStyle/>
+            <a:p>
+              <a:pPr algn="ctr"/>
+              <a:endParaRPr lang="en-CA"/>
+            </a:p>
+          </p:txBody>
+        </p:sp>
+      </p:grpSp>
+    </p:spTree>
+    <p:extLst>
+      <p:ext uri="{BB962C8B-B14F-4D97-AF65-F5344CB8AC3E}">
+        <p14:creationId xmlns:p14="http://schemas.microsoft.com/office/powerpoint/2010/main" val="3364651937"/>
       </p:ext>
     </p:extLst>
   </p:cSld>

</xml_diff>

<commit_message>
dashboard ui check in
</commit_message>
<xml_diff>
--- a/Test_Code/UI_examples/UI Mockup.pptx
+++ b/Test_Code/UI_examples/UI Mockup.pptx
@@ -3483,7 +3483,7 @@
               <a:avLst/>
             </a:prstGeom>
             <a:solidFill>
-              <a:schemeClr val="bg1"/>
+              <a:srgbClr val="00B050"/>
             </a:solidFill>
             <a:ln w="28575">
               <a:solidFill>
@@ -4208,6 +4208,46 @@
           <a:xfrm>
             <a:off x="4123719" y="6154547"/>
             <a:ext cx="355413" cy="362063"/>
+          </a:xfrm>
+          <a:prstGeom prst="rect">
+            <a:avLst/>
+          </a:prstGeom>
+        </p:spPr>
+      </p:pic>
+      <p:pic>
+        <p:nvPicPr>
+          <p:cNvPr id="3" name="Picture 2"/>
+          <p:cNvPicPr>
+            <a:picLocks noChangeAspect="1"/>
+          </p:cNvPicPr>
+          <p:nvPr/>
+        </p:nvPicPr>
+        <p:blipFill>
+          <a:blip r:embed="rId5" cstate="print">
+            <a:lum bright="70000" contrast="-70000"/>
+            <a:extLst>
+              <a:ext uri="{BEBA8EAE-BF5A-486C-A8C5-ECC9F3942E4B}">
+                <a14:imgProps xmlns:a14="http://schemas.microsoft.com/office/drawing/2010/main">
+                  <a14:imgLayer r:embed="rId6">
+                    <a14:imgEffect>
+                      <a14:artisticPaintStrokes/>
+                    </a14:imgEffect>
+                  </a14:imgLayer>
+                </a14:imgProps>
+              </a:ext>
+              <a:ext uri="{28A0092B-C50C-407E-A947-70E740481C1C}">
+                <a14:useLocalDpi xmlns:a14="http://schemas.microsoft.com/office/drawing/2010/main" val="0"/>
+              </a:ext>
+            </a:extLst>
+          </a:blip>
+          <a:stretch>
+            <a:fillRect/>
+          </a:stretch>
+        </p:blipFill>
+        <p:spPr>
+          <a:xfrm>
+            <a:off x="3996271" y="6024971"/>
+            <a:ext cx="613073" cy="613073"/>
           </a:xfrm>
           <a:prstGeom prst="rect">
             <a:avLst/>

</xml_diff>